<commit_message>
chore: update interaction image
</commit_message>
<xml_diff>
--- a/documentation/3_Layers_of_the_Reference_Architecture_Model/3_5_System_Layer/media/3.5.0.1_interaction_between_technical_components.pptx
+++ b/documentation/3_Layers_of_the_Reference_Architecture_Model/3_5_System_Layer/media/3.5.0.1_interaction_between_technical_components.pptx
@@ -104,6 +104,11 @@
       </a:defRPr>
     </a:lvl9pPr>
   </p:defaultTextStyle>
+  <p:extLst>
+    <p:ext uri="{EFAFB233-063F-42B5-8137-9DF3F51BA10A}">
+      <p15:sldGuideLst xmlns:p15="http://schemas.microsoft.com/office/powerpoint/2012/main"/>
+    </p:ext>
+  </p:extLst>
 </p:presentation>
 </file>
 
@@ -256,7 +261,7 @@
           <a:p>
             <a:fld id="{D119A276-5117-407A-9811-4B1AA596C590}" type="datetimeFigureOut">
               <a:rPr lang="en-US" smtClean="0"/>
-              <a:t>3/14/2022</a:t>
+              <a:t>3/25/2022</a:t>
             </a:fld>
             <a:endParaRPr lang="en-US"/>
           </a:p>
@@ -456,7 +461,7 @@
           <a:p>
             <a:fld id="{D119A276-5117-407A-9811-4B1AA596C590}" type="datetimeFigureOut">
               <a:rPr lang="en-US" smtClean="0"/>
-              <a:t>3/14/2022</a:t>
+              <a:t>3/25/2022</a:t>
             </a:fld>
             <a:endParaRPr lang="en-US"/>
           </a:p>
@@ -666,7 +671,7 @@
           <a:p>
             <a:fld id="{D119A276-5117-407A-9811-4B1AA596C590}" type="datetimeFigureOut">
               <a:rPr lang="en-US" smtClean="0"/>
-              <a:t>3/14/2022</a:t>
+              <a:t>3/25/2022</a:t>
             </a:fld>
             <a:endParaRPr lang="en-US"/>
           </a:p>
@@ -866,7 +871,7 @@
           <a:p>
             <a:fld id="{D119A276-5117-407A-9811-4B1AA596C590}" type="datetimeFigureOut">
               <a:rPr lang="en-US" smtClean="0"/>
-              <a:t>3/14/2022</a:t>
+              <a:t>3/25/2022</a:t>
             </a:fld>
             <a:endParaRPr lang="en-US"/>
           </a:p>
@@ -1142,7 +1147,7 @@
           <a:p>
             <a:fld id="{D119A276-5117-407A-9811-4B1AA596C590}" type="datetimeFigureOut">
               <a:rPr lang="en-US" smtClean="0"/>
-              <a:t>3/14/2022</a:t>
+              <a:t>3/25/2022</a:t>
             </a:fld>
             <a:endParaRPr lang="en-US"/>
           </a:p>
@@ -1410,7 +1415,7 @@
           <a:p>
             <a:fld id="{D119A276-5117-407A-9811-4B1AA596C590}" type="datetimeFigureOut">
               <a:rPr lang="en-US" smtClean="0"/>
-              <a:t>3/14/2022</a:t>
+              <a:t>3/25/2022</a:t>
             </a:fld>
             <a:endParaRPr lang="en-US"/>
           </a:p>
@@ -1825,7 +1830,7 @@
           <a:p>
             <a:fld id="{D119A276-5117-407A-9811-4B1AA596C590}" type="datetimeFigureOut">
               <a:rPr lang="en-US" smtClean="0"/>
-              <a:t>3/14/2022</a:t>
+              <a:t>3/25/2022</a:t>
             </a:fld>
             <a:endParaRPr lang="en-US"/>
           </a:p>
@@ -1967,7 +1972,7 @@
           <a:p>
             <a:fld id="{D119A276-5117-407A-9811-4B1AA596C590}" type="datetimeFigureOut">
               <a:rPr lang="en-US" smtClean="0"/>
-              <a:t>3/14/2022</a:t>
+              <a:t>3/25/2022</a:t>
             </a:fld>
             <a:endParaRPr lang="en-US"/>
           </a:p>
@@ -2080,7 +2085,7 @@
           <a:p>
             <a:fld id="{D119A276-5117-407A-9811-4B1AA596C590}" type="datetimeFigureOut">
               <a:rPr lang="en-US" smtClean="0"/>
-              <a:t>3/14/2022</a:t>
+              <a:t>3/25/2022</a:t>
             </a:fld>
             <a:endParaRPr lang="en-US"/>
           </a:p>
@@ -2393,7 +2398,7 @@
           <a:p>
             <a:fld id="{D119A276-5117-407A-9811-4B1AA596C590}" type="datetimeFigureOut">
               <a:rPr lang="en-US" smtClean="0"/>
-              <a:t>3/14/2022</a:t>
+              <a:t>3/25/2022</a:t>
             </a:fld>
             <a:endParaRPr lang="en-US"/>
           </a:p>
@@ -2682,7 +2687,7 @@
           <a:p>
             <a:fld id="{D119A276-5117-407A-9811-4B1AA596C590}" type="datetimeFigureOut">
               <a:rPr lang="en-US" smtClean="0"/>
-              <a:t>3/14/2022</a:t>
+              <a:t>3/25/2022</a:t>
             </a:fld>
             <a:endParaRPr lang="en-US"/>
           </a:p>
@@ -2925,7 +2930,7 @@
           <a:p>
             <a:fld id="{D119A276-5117-407A-9811-4B1AA596C590}" type="datetimeFigureOut">
               <a:rPr lang="en-US" smtClean="0"/>
-              <a:t>3/14/2022</a:t>
+              <a:t>3/25/2022</a:t>
             </a:fld>
             <a:endParaRPr lang="en-US"/>
           </a:p>
@@ -3356,7 +3361,7 @@
         </p:nvSpPr>
         <p:spPr>
           <a:xfrm>
-            <a:off x="3595846" y="3027884"/>
+            <a:off x="3056078" y="3027884"/>
             <a:ext cx="430485" cy="1"/>
           </a:xfrm>
           <a:prstGeom prst="line">
@@ -3390,7 +3395,7 @@
         </p:nvGrpSpPr>
         <p:grpSpPr>
           <a:xfrm>
-            <a:off x="5838458" y="1533160"/>
+            <a:off x="5281912" y="1549890"/>
             <a:ext cx="1257107" cy="759770"/>
             <a:chOff x="0" y="0"/>
             <a:chExt cx="907692" cy="525767"/>
@@ -3478,7 +3483,7 @@
             <a:effectLst/>
             <a:extLst>
               <a:ext uri="{C572A759-6A51-4108-AA02-DFA0A04FC94B}">
-                <ma14:wrappingTextBoxFlag xmlns:ma14="http://schemas.microsoft.com/office/mac/drawingml/2011/main" xmlns="" val="1"/>
+                <ma14:wrappingTextBoxFlag xmlns="" xmlns:ma14="http://schemas.microsoft.com/office/mac/drawingml/2011/main" val="1"/>
               </a:ext>
             </a:extLst>
           </p:spPr>
@@ -3496,12 +3501,20 @@
             </a:lstStyle>
             <a:p>
               <a:r>
+                <a:rPr lang="de-DE" dirty="0"/>
+                <a:t>  </a:t>
+              </a:r>
+              <a:r>
                 <a:rPr lang="de-DE" dirty="0" err="1"/>
                 <a:t>Metadata</a:t>
               </a:r>
               <a:endParaRPr lang="de-DE" dirty="0"/>
             </a:p>
             <a:p>
+              <a:r>
+                <a:rPr lang="de-DE" dirty="0"/>
+                <a:t>  </a:t>
+              </a:r>
               <a:r>
                 <a:rPr dirty="0"/>
                 <a:t>Broker</a:t>
@@ -3524,10 +3537,10 @@
         </p:nvGrpSpPr>
         <p:grpSpPr>
           <a:xfrm>
-            <a:off x="5805998" y="4945010"/>
-            <a:ext cx="1257105" cy="759768"/>
+            <a:off x="5291397" y="4880830"/>
+            <a:ext cx="1257106" cy="759769"/>
             <a:chOff x="0" y="0"/>
-            <a:chExt cx="907691" cy="525766"/>
+            <a:chExt cx="907692" cy="525767"/>
           </a:xfrm>
         </p:grpSpPr>
         <p:sp>
@@ -3598,8 +3611,8 @@
           </p:nvSpPr>
           <p:spPr>
             <a:xfrm>
-              <a:off x="0" y="52063"/>
-              <a:ext cx="907692" cy="421641"/>
+              <a:off x="0" y="113795"/>
+              <a:ext cx="907692" cy="298176"/>
             </a:xfrm>
             <a:prstGeom prst="rect">
               <a:avLst/>
@@ -3612,7 +3625,7 @@
             <a:effectLst/>
             <a:extLst>
               <a:ext uri="{C572A759-6A51-4108-AA02-DFA0A04FC94B}">
-                <ma14:wrappingTextBoxFlag xmlns:ma14="http://schemas.microsoft.com/office/mac/drawingml/2011/main" xmlns="" val="1"/>
+                <ma14:wrappingTextBoxFlag xmlns="" xmlns:ma14="http://schemas.microsoft.com/office/mac/drawingml/2011/main" val="1"/>
               </a:ext>
             </a:extLst>
           </p:spPr>
@@ -3629,10 +3642,22 @@
                 <a:defRPr sz="1100"/>
               </a:pPr>
               <a:r>
+                <a:rPr lang="de-DE" dirty="0"/>
+                <a:t>  </a:t>
+              </a:r>
+              <a:r>
+                <a:rPr dirty="0"/>
                 <a:t>App</a:t>
               </a:r>
-              <a:br/>
+              <a:br>
+                <a:rPr dirty="0"/>
+              </a:br>
               <a:r>
+                <a:rPr lang="de-DE" dirty="0"/>
+                <a:t>  </a:t>
+              </a:r>
+              <a:r>
+                <a:rPr dirty="0"/>
                 <a:t>Store</a:t>
               </a:r>
             </a:p>
@@ -3653,10 +3678,10 @@
         </p:nvGrpSpPr>
         <p:grpSpPr>
           <a:xfrm>
-            <a:off x="2790645" y="2649196"/>
-            <a:ext cx="805204" cy="724535"/>
-            <a:chOff x="0" y="0"/>
-            <a:chExt cx="581397" cy="501384"/>
+            <a:off x="2250876" y="2649196"/>
+            <a:ext cx="805207" cy="724536"/>
+            <a:chOff x="-1" y="0"/>
+            <a:chExt cx="581399" cy="501385"/>
           </a:xfrm>
         </p:grpSpPr>
         <p:sp>
@@ -3774,7 +3799,7 @@
           <p:spPr>
             <a:xfrm>
               <a:off x="-1" y="88900"/>
-              <a:ext cx="581399" cy="396240"/>
+              <a:ext cx="581399" cy="312375"/>
             </a:xfrm>
             <a:prstGeom prst="rect">
               <a:avLst/>
@@ -3787,7 +3812,7 @@
             <a:effectLst/>
             <a:extLst>
               <a:ext uri="{C572A759-6A51-4108-AA02-DFA0A04FC94B}">
-                <ma14:wrappingTextBoxFlag xmlns:ma14="http://schemas.microsoft.com/office/mac/drawingml/2011/main" xmlns="" val="1"/>
+                <ma14:wrappingTextBoxFlag xmlns="" xmlns:ma14="http://schemas.microsoft.com/office/mac/drawingml/2011/main" val="1"/>
               </a:ext>
             </a:extLst>
           </p:spPr>
@@ -3804,7 +3829,11 @@
               </a:lvl1pPr>
             </a:lstStyle>
             <a:p>
+              <a:endParaRPr lang="de-DE" dirty="0"/>
+            </a:p>
+            <a:p>
               <a:r>
+                <a:rPr dirty="0"/>
                 <a:t>Data Source</a:t>
               </a:r>
             </a:p>
@@ -3825,7 +3854,7 @@
         </p:nvSpPr>
         <p:spPr>
           <a:xfrm>
-            <a:off x="2790645" y="2710809"/>
+            <a:off x="2250877" y="2710809"/>
             <a:ext cx="805204" cy="102692"/>
           </a:xfrm>
           <a:custGeom>
@@ -3901,7 +3930,7 @@
         </p:nvGrpSpPr>
         <p:grpSpPr>
           <a:xfrm>
-            <a:off x="4045457" y="2714691"/>
+            <a:off x="3505689" y="2714691"/>
             <a:ext cx="1257107" cy="759770"/>
             <a:chOff x="0" y="0"/>
             <a:chExt cx="907692" cy="525767"/>
@@ -3988,7 +4017,7 @@
             <a:effectLst/>
             <a:extLst>
               <a:ext uri="{C572A759-6A51-4108-AA02-DFA0A04FC94B}">
-                <ma14:wrappingTextBoxFlag xmlns:ma14="http://schemas.microsoft.com/office/mac/drawingml/2011/main" xmlns="" val="1"/>
+                <ma14:wrappingTextBoxFlag xmlns="" xmlns:ma14="http://schemas.microsoft.com/office/mac/drawingml/2011/main" val="1"/>
               </a:ext>
             </a:extLst>
           </p:spPr>
@@ -4031,7 +4060,7 @@
         </p:nvSpPr>
         <p:spPr>
           <a:xfrm>
-            <a:off x="4045457" y="3522986"/>
+            <a:off x="3505689" y="3522986"/>
             <a:ext cx="1267604" cy="220229"/>
           </a:xfrm>
           <a:prstGeom prst="rect">
@@ -4042,7 +4071,7 @@
           </a:ln>
           <a:extLst>
             <a:ext uri="{C572A759-6A51-4108-AA02-DFA0A04FC94B}">
-              <ma14:wrappingTextBoxFlag xmlns:ma14="http://schemas.microsoft.com/office/mac/drawingml/2011/main" xmlns="" val="1"/>
+              <ma14:wrappingTextBoxFlag xmlns="" xmlns:ma14="http://schemas.microsoft.com/office/mac/drawingml/2011/main" val="1"/>
             </a:ext>
           </a:extLst>
         </p:spPr>
@@ -4079,7 +4108,7 @@
         </p:nvSpPr>
         <p:spPr>
           <a:xfrm>
-            <a:off x="7508173" y="3517574"/>
+            <a:off x="6968405" y="3517574"/>
             <a:ext cx="1271798" cy="220229"/>
           </a:xfrm>
           <a:prstGeom prst="rect">
@@ -4090,7 +4119,7 @@
           </a:ln>
           <a:extLst>
             <a:ext uri="{C572A759-6A51-4108-AA02-DFA0A04FC94B}">
-              <ma14:wrappingTextBoxFlag xmlns:ma14="http://schemas.microsoft.com/office/mac/drawingml/2011/main" xmlns="" val="1"/>
+              <ma14:wrappingTextBoxFlag xmlns="" xmlns:ma14="http://schemas.microsoft.com/office/mac/drawingml/2011/main" val="1"/>
             </a:ext>
           </a:extLst>
         </p:spPr>
@@ -4128,7 +4157,7 @@
         </p:nvSpPr>
         <p:spPr>
           <a:xfrm flipH="1">
-            <a:off x="8779971" y="3027884"/>
+            <a:off x="8240203" y="3027884"/>
             <a:ext cx="604511" cy="1"/>
           </a:xfrm>
           <a:prstGeom prst="line">
@@ -4162,7 +4191,7 @@
         </p:nvSpPr>
         <p:spPr>
           <a:xfrm>
-            <a:off x="2290235" y="3978037"/>
+            <a:off x="1328285" y="3838868"/>
             <a:ext cx="2606072" cy="2064299"/>
           </a:xfrm>
           <a:prstGeom prst="rect">
@@ -4199,8 +4228,8 @@
         </p:nvSpPr>
         <p:spPr>
           <a:xfrm>
-            <a:off x="2898183" y="4120426"/>
-            <a:ext cx="1839862" cy="367048"/>
+            <a:off x="1936233" y="3981257"/>
+            <a:ext cx="1839862" cy="246221"/>
           </a:xfrm>
           <a:prstGeom prst="rect">
             <a:avLst/>
@@ -4210,7 +4239,7 @@
           </a:ln>
           <a:extLst>
             <a:ext uri="{C572A759-6A51-4108-AA02-DFA0A04FC94B}">
-              <ma14:wrappingTextBoxFlag xmlns:ma14="http://schemas.microsoft.com/office/mac/drawingml/2011/main" xmlns="" val="1"/>
+              <ma14:wrappingTextBoxFlag xmlns="" xmlns:ma14="http://schemas.microsoft.com/office/mac/drawingml/2011/main" val="1"/>
             </a:ext>
           </a:extLst>
         </p:spPr>
@@ -4228,8 +4257,30 @@
           </a:lstStyle>
           <a:p>
             <a:r>
+              <a:rPr dirty="0"/>
               <a:t>Dataset(s) transferred from Provider to Consumer</a:t>
             </a:r>
+            <a:r>
+              <a:rPr lang="de-DE" dirty="0"/>
+              <a:t> (</a:t>
+            </a:r>
+            <a:r>
+              <a:rPr lang="de-DE" dirty="0" err="1"/>
+              <a:t>or</a:t>
+            </a:r>
+            <a:r>
+              <a:rPr lang="de-DE" dirty="0"/>
+              <a:t> vice </a:t>
+            </a:r>
+            <a:r>
+              <a:rPr lang="de-DE" dirty="0" err="1"/>
+              <a:t>versa</a:t>
+            </a:r>
+            <a:r>
+              <a:rPr lang="de-DE" dirty="0"/>
+              <a:t>)</a:t>
+            </a:r>
+            <a:endParaRPr dirty="0"/>
           </a:p>
         </p:txBody>
       </p:sp>
@@ -4247,7 +4298,7 @@
         </p:nvSpPr>
         <p:spPr>
           <a:xfrm>
-            <a:off x="2916500" y="4615540"/>
+            <a:off x="1954550" y="4476371"/>
             <a:ext cx="1824085" cy="385400"/>
           </a:xfrm>
           <a:prstGeom prst="rect">
@@ -4258,7 +4309,7 @@
           </a:ln>
           <a:extLst>
             <a:ext uri="{C572A759-6A51-4108-AA02-DFA0A04FC94B}">
-              <ma14:wrappingTextBoxFlag xmlns:ma14="http://schemas.microsoft.com/office/mac/drawingml/2011/main" xmlns="" val="1"/>
+              <ma14:wrappingTextBoxFlag xmlns="" xmlns:ma14="http://schemas.microsoft.com/office/mac/drawingml/2011/main" val="1"/>
             </a:ext>
           </a:extLst>
         </p:spPr>
@@ -4310,8 +4361,8 @@
         </p:nvSpPr>
         <p:spPr>
           <a:xfrm>
-            <a:off x="2916500" y="5580437"/>
-            <a:ext cx="1940613" cy="367048"/>
+            <a:off x="1954550" y="5441268"/>
+            <a:ext cx="1940613" cy="246221"/>
           </a:xfrm>
           <a:prstGeom prst="rect">
             <a:avLst/>
@@ -4321,7 +4372,7 @@
           </a:ln>
           <a:extLst>
             <a:ext uri="{C572A759-6A51-4108-AA02-DFA0A04FC94B}">
-              <ma14:wrappingTextBoxFlag xmlns:ma14="http://schemas.microsoft.com/office/mac/drawingml/2011/main" xmlns="" val="1"/>
+              <ma14:wrappingTextBoxFlag xmlns="" xmlns:ma14="http://schemas.microsoft.com/office/mac/drawingml/2011/main" val="1"/>
             </a:ext>
           </a:extLst>
         </p:spPr>
@@ -4345,9 +4396,30 @@
               <a:rPr dirty="0"/>
             </a:br>
             <a:r>
-              <a:rPr dirty="0"/>
+              <a:rPr lang="de-DE" dirty="0" err="1"/>
+              <a:t>processing</a:t>
+            </a:r>
+            <a:r>
+              <a:rPr lang="de-DE" dirty="0"/>
+              <a:t> (e.g., </a:t>
+            </a:r>
+            <a:r>
+              <a:rPr lang="de-DE" dirty="0" err="1"/>
               <a:t>manipulation</a:t>
             </a:r>
+            <a:r>
+              <a:rPr lang="de-DE" dirty="0"/>
+              <a:t>, </a:t>
+            </a:r>
+            <a:r>
+              <a:rPr lang="de-DE" dirty="0" err="1"/>
+              <a:t>analysis</a:t>
+            </a:r>
+            <a:r>
+              <a:rPr lang="de-DE" dirty="0"/>
+              <a:t>)</a:t>
+            </a:r>
+            <a:endParaRPr dirty="0"/>
           </a:p>
         </p:txBody>
       </p:sp>
@@ -4365,8 +4437,8 @@
         </p:nvSpPr>
         <p:spPr>
           <a:xfrm>
-            <a:off x="7842150" y="3973325"/>
-            <a:ext cx="2785417" cy="1656916"/>
+            <a:off x="7691254" y="4242175"/>
+            <a:ext cx="2606072" cy="1656916"/>
           </a:xfrm>
           <a:prstGeom prst="rect">
             <a:avLst/>
@@ -4402,7 +4474,7 @@
         </p:nvSpPr>
         <p:spPr>
           <a:xfrm>
-            <a:off x="8862393" y="4241310"/>
+            <a:off x="8711496" y="4510160"/>
             <a:ext cx="1464545" cy="183525"/>
           </a:xfrm>
           <a:prstGeom prst="rect">
@@ -4413,7 +4485,7 @@
           </a:ln>
           <a:extLst>
             <a:ext uri="{C572A759-6A51-4108-AA02-DFA0A04FC94B}">
-              <ma14:wrappingTextBoxFlag xmlns:ma14="http://schemas.microsoft.com/office/mac/drawingml/2011/main" xmlns="" val="1"/>
+              <ma14:wrappingTextBoxFlag xmlns="" xmlns:ma14="http://schemas.microsoft.com/office/mac/drawingml/2011/main" val="1"/>
             </a:ext>
           </a:extLst>
         </p:spPr>
@@ -4431,7 +4503,20 @@
           </a:lstStyle>
           <a:p>
             <a:r>
-              <a:t>Data exchange (active)</a:t>
+              <a:rPr dirty="0"/>
+              <a:t>Data </a:t>
+            </a:r>
+            <a:r>
+              <a:rPr lang="de-DE" dirty="0"/>
+              <a:t>e</a:t>
+            </a:r>
+            <a:r>
+              <a:rPr dirty="0" err="1"/>
+              <a:t>xchange</a:t>
+            </a:r>
+            <a:r>
+              <a:rPr dirty="0"/>
+              <a:t> (active)</a:t>
             </a:r>
           </a:p>
         </p:txBody>
@@ -4450,7 +4535,7 @@
         </p:nvSpPr>
         <p:spPr>
           <a:xfrm>
-            <a:off x="8878492" y="5201447"/>
+            <a:off x="8727595" y="5470297"/>
             <a:ext cx="909466" cy="183525"/>
           </a:xfrm>
           <a:prstGeom prst="rect">
@@ -4461,7 +4546,7 @@
           </a:ln>
           <a:extLst>
             <a:ext uri="{C572A759-6A51-4108-AA02-DFA0A04FC94B}">
-              <ma14:wrappingTextBoxFlag xmlns:ma14="http://schemas.microsoft.com/office/mac/drawingml/2011/main" xmlns="" val="1"/>
+              <ma14:wrappingTextBoxFlag xmlns="" xmlns:ma14="http://schemas.microsoft.com/office/mac/drawingml/2011/main" val="1"/>
             </a:ext>
           </a:extLst>
         </p:spPr>
@@ -4498,7 +4583,7 @@
         </p:nvSpPr>
         <p:spPr>
           <a:xfrm>
-            <a:off x="8878492" y="4869381"/>
+            <a:off x="8727595" y="5138231"/>
             <a:ext cx="1253615" cy="183525"/>
           </a:xfrm>
           <a:prstGeom prst="rect">
@@ -4509,7 +4594,7 @@
           </a:ln>
           <a:extLst>
             <a:ext uri="{C572A759-6A51-4108-AA02-DFA0A04FC94B}">
-              <ma14:wrappingTextBoxFlag xmlns:ma14="http://schemas.microsoft.com/office/mac/drawingml/2011/main" xmlns="" val="1"/>
+              <ma14:wrappingTextBoxFlag xmlns="" xmlns:ma14="http://schemas.microsoft.com/office/mac/drawingml/2011/main" val="1"/>
             </a:ext>
           </a:extLst>
         </p:spPr>
@@ -4527,6 +4612,7 @@
           </a:lstStyle>
           <a:p>
             <a:r>
+              <a:rPr dirty="0"/>
               <a:t>Metadata exchange</a:t>
             </a:r>
           </a:p>
@@ -4546,7 +4632,7 @@
         </p:nvSpPr>
         <p:spPr>
           <a:xfrm>
-            <a:off x="8876245" y="4559727"/>
+            <a:off x="8725348" y="4828577"/>
             <a:ext cx="1574061" cy="183525"/>
           </a:xfrm>
           <a:prstGeom prst="rect">
@@ -4557,7 +4643,7 @@
           </a:ln>
           <a:extLst>
             <a:ext uri="{C572A759-6A51-4108-AA02-DFA0A04FC94B}">
-              <ma14:wrappingTextBoxFlag xmlns:ma14="http://schemas.microsoft.com/office/mac/drawingml/2011/main" xmlns="" val="1"/>
+              <ma14:wrappingTextBoxFlag xmlns="" xmlns:ma14="http://schemas.microsoft.com/office/mac/drawingml/2011/main" val="1"/>
             </a:ext>
           </a:extLst>
         </p:spPr>
@@ -4595,7 +4681,7 @@
         </p:nvSpPr>
         <p:spPr>
           <a:xfrm>
-            <a:off x="7923929" y="4641575"/>
+            <a:off x="7773032" y="4910425"/>
             <a:ext cx="818806" cy="3"/>
           </a:xfrm>
           <a:prstGeom prst="line">
@@ -4631,7 +4717,7 @@
         </p:nvSpPr>
         <p:spPr>
           <a:xfrm>
-            <a:off x="7938090" y="4953745"/>
+            <a:off x="7787193" y="5222595"/>
             <a:ext cx="804646" cy="1"/>
           </a:xfrm>
           <a:prstGeom prst="line">
@@ -4668,7 +4754,7 @@
         </p:nvSpPr>
         <p:spPr>
           <a:xfrm>
-            <a:off x="7916818" y="4329409"/>
+            <a:off x="7765921" y="4598259"/>
             <a:ext cx="805034" cy="1"/>
           </a:xfrm>
           <a:prstGeom prst="line">
@@ -4704,7 +4790,7 @@
         </p:nvSpPr>
         <p:spPr>
           <a:xfrm>
-            <a:off x="7980215" y="5265916"/>
+            <a:off x="7829318" y="5534766"/>
             <a:ext cx="762522" cy="1"/>
           </a:xfrm>
           <a:prstGeom prst="line">
@@ -4740,7 +4826,7 @@
         </p:nvSpPr>
         <p:spPr>
           <a:xfrm>
-            <a:off x="7148500" y="1050550"/>
+            <a:off x="6608732" y="1050550"/>
             <a:ext cx="1121529" cy="1545964"/>
           </a:xfrm>
           <a:prstGeom prst="line">
@@ -4776,7 +4862,7 @@
         </p:nvSpPr>
         <p:spPr>
           <a:xfrm flipH="1">
-            <a:off x="4572000" y="1082314"/>
+            <a:off x="4032232" y="1082314"/>
             <a:ext cx="1197694" cy="1566882"/>
           </a:xfrm>
           <a:prstGeom prst="line">
@@ -4812,8 +4898,8 @@
         </p:nvSpPr>
         <p:spPr>
           <a:xfrm>
-            <a:off x="7166350" y="815659"/>
-            <a:ext cx="1365254" cy="1780856"/>
+            <a:off x="6626582" y="815659"/>
+            <a:ext cx="1282030" cy="1777067"/>
           </a:xfrm>
           <a:prstGeom prst="line">
             <a:avLst/>
@@ -4849,8 +4935,8 @@
         </p:nvSpPr>
         <p:spPr>
           <a:xfrm flipH="1">
-            <a:off x="4260606" y="815660"/>
-            <a:ext cx="1524290" cy="1863836"/>
+            <a:off x="3792782" y="815660"/>
+            <a:ext cx="1452345" cy="1838616"/>
           </a:xfrm>
           <a:prstGeom prst="line">
             <a:avLst/>
@@ -4886,7 +4972,7 @@
         </p:nvGrpSpPr>
         <p:grpSpPr>
           <a:xfrm>
-            <a:off x="7512562" y="2683838"/>
+            <a:off x="6972794" y="2683838"/>
             <a:ext cx="1257107" cy="759768"/>
             <a:chOff x="0" y="0"/>
             <a:chExt cx="907692" cy="525767"/>
@@ -4973,7 +5059,7 @@
             <a:effectLst/>
             <a:extLst>
               <a:ext uri="{C572A759-6A51-4108-AA02-DFA0A04FC94B}">
-                <ma14:wrappingTextBoxFlag xmlns:ma14="http://schemas.microsoft.com/office/mac/drawingml/2011/main" xmlns="" val="1"/>
+                <ma14:wrappingTextBoxFlag xmlns="" xmlns:ma14="http://schemas.microsoft.com/office/mac/drawingml/2011/main" val="1"/>
               </a:ext>
             </a:extLst>
           </p:spPr>
@@ -5016,10 +5102,10 @@
         </p:nvGrpSpPr>
         <p:grpSpPr>
           <a:xfrm>
-            <a:off x="9228215" y="2679495"/>
-            <a:ext cx="805204" cy="724535"/>
-            <a:chOff x="0" y="0"/>
-            <a:chExt cx="581397" cy="501384"/>
+            <a:off x="8688446" y="2679495"/>
+            <a:ext cx="805207" cy="724536"/>
+            <a:chOff x="-1" y="0"/>
+            <a:chExt cx="581399" cy="501385"/>
           </a:xfrm>
         </p:grpSpPr>
         <p:sp>
@@ -5137,7 +5223,7 @@
           <p:spPr>
             <a:xfrm>
               <a:off x="-1" y="88900"/>
-              <a:ext cx="581399" cy="396240"/>
+              <a:ext cx="581399" cy="312375"/>
             </a:xfrm>
             <a:prstGeom prst="rect">
               <a:avLst/>
@@ -5150,7 +5236,7 @@
             <a:effectLst/>
             <a:extLst>
               <a:ext uri="{C572A759-6A51-4108-AA02-DFA0A04FC94B}">
-                <ma14:wrappingTextBoxFlag xmlns:ma14="http://schemas.microsoft.com/office/mac/drawingml/2011/main" xmlns="" val="1"/>
+                <ma14:wrappingTextBoxFlag xmlns="" xmlns:ma14="http://schemas.microsoft.com/office/mac/drawingml/2011/main" val="1"/>
               </a:ext>
             </a:extLst>
           </p:spPr>
@@ -5167,7 +5253,11 @@
               </a:lvl1pPr>
             </a:lstStyle>
             <a:p>
+              <a:endParaRPr lang="de-DE" dirty="0"/>
+            </a:p>
+            <a:p>
               <a:r>
+                <a:rPr dirty="0"/>
                 <a:t>Data Sink</a:t>
               </a:r>
             </a:p>
@@ -5188,7 +5278,7 @@
         </p:nvSpPr>
         <p:spPr>
           <a:xfrm>
-            <a:off x="9228215" y="2741109"/>
+            <a:off x="8688447" y="2741109"/>
             <a:ext cx="805204" cy="102692"/>
           </a:xfrm>
           <a:custGeom>
@@ -5264,10 +5354,10 @@
         </p:nvGrpSpPr>
         <p:grpSpPr>
           <a:xfrm>
-            <a:off x="5831324" y="411298"/>
-            <a:ext cx="1257107" cy="759770"/>
-            <a:chOff x="0" y="0"/>
-            <a:chExt cx="907692" cy="525767"/>
+            <a:off x="5278042" y="434364"/>
+            <a:ext cx="1266750" cy="759770"/>
+            <a:chOff x="-6963" y="-5595"/>
+            <a:chExt cx="914655" cy="525767"/>
           </a:xfrm>
         </p:grpSpPr>
         <p:sp>
@@ -5284,7 +5374,7 @@
           </p:nvSpPr>
           <p:spPr>
             <a:xfrm>
-              <a:off x="0" y="0"/>
+              <a:off x="-6963" y="-5595"/>
               <a:ext cx="907692" cy="525767"/>
             </a:xfrm>
             <a:prstGeom prst="rect">
@@ -5337,8 +5427,8 @@
           </p:nvSpPr>
           <p:spPr>
             <a:xfrm>
-              <a:off x="0" y="177691"/>
-              <a:ext cx="907692" cy="170386"/>
+              <a:off x="0" y="172367"/>
+              <a:ext cx="907692" cy="181035"/>
             </a:xfrm>
             <a:prstGeom prst="rect">
               <a:avLst/>
@@ -5351,7 +5441,7 @@
             <a:effectLst/>
             <a:extLst>
               <a:ext uri="{C572A759-6A51-4108-AA02-DFA0A04FC94B}">
-                <ma14:wrappingTextBoxFlag xmlns:ma14="http://schemas.microsoft.com/office/mac/drawingml/2011/main" xmlns="" val="1"/>
+                <ma14:wrappingTextBoxFlag xmlns="" xmlns:ma14="http://schemas.microsoft.com/office/mac/drawingml/2011/main" val="1"/>
               </a:ext>
             </a:extLst>
           </p:spPr>
@@ -5369,11 +5459,11 @@
             </a:lstStyle>
             <a:p>
               <a:r>
-                <a:rPr lang="de-DE" dirty="0"/>
+                <a:rPr lang="de-DE" sz="1100" dirty="0"/>
                 <a:t>IDS </a:t>
               </a:r>
               <a:r>
-                <a:rPr dirty="0"/>
+                <a:rPr sz="1100" dirty="0"/>
                 <a:t>Connector</a:t>
               </a:r>
             </a:p>
@@ -5394,7 +5484,7 @@
         </p:nvSpPr>
         <p:spPr>
           <a:xfrm flipV="1">
-            <a:off x="5381055" y="2166096"/>
+            <a:off x="4841287" y="2166096"/>
             <a:ext cx="353342" cy="507188"/>
           </a:xfrm>
           <a:prstGeom prst="line">
@@ -5430,7 +5520,7 @@
         </p:nvSpPr>
         <p:spPr>
           <a:xfrm flipH="1" flipV="1">
-            <a:off x="7199625" y="2116649"/>
+            <a:off x="6659857" y="2116649"/>
             <a:ext cx="265847" cy="523571"/>
           </a:xfrm>
           <a:prstGeom prst="line">
@@ -5466,7 +5556,7 @@
         </p:nvGrpSpPr>
         <p:grpSpPr>
           <a:xfrm>
-            <a:off x="5295493" y="2126857"/>
+            <a:off x="4755725" y="2126857"/>
             <a:ext cx="307130" cy="401392"/>
             <a:chOff x="-6824" y="-1"/>
             <a:chExt cx="221761" cy="277767"/>
@@ -5605,7 +5695,7 @@
               <a:effectLst/>
               <a:extLst>
                 <a:ext uri="{C572A759-6A51-4108-AA02-DFA0A04FC94B}">
-                  <ma14:wrappingTextBoxFlag xmlns:ma14="http://schemas.microsoft.com/office/mac/drawingml/2011/main" xmlns="" val="1"/>
+                  <ma14:wrappingTextBoxFlag xmlns="" xmlns:ma14="http://schemas.microsoft.com/office/mac/drawingml/2011/main" val="1"/>
                 </a:ext>
               </a:extLst>
             </p:spPr>
@@ -5718,7 +5808,7 @@
         </p:nvGrpSpPr>
         <p:grpSpPr>
           <a:xfrm>
-            <a:off x="7322990" y="2127346"/>
+            <a:off x="6783222" y="2127346"/>
             <a:ext cx="308693" cy="401392"/>
             <a:chOff x="-7953" y="-1"/>
             <a:chExt cx="222890" cy="277767"/>
@@ -5857,7 +5947,7 @@
               <a:effectLst/>
               <a:extLst>
                 <a:ext uri="{C572A759-6A51-4108-AA02-DFA0A04FC94B}">
-                  <ma14:wrappingTextBoxFlag xmlns:ma14="http://schemas.microsoft.com/office/mac/drawingml/2011/main" xmlns="" val="1"/>
+                  <ma14:wrappingTextBoxFlag xmlns="" xmlns:ma14="http://schemas.microsoft.com/office/mac/drawingml/2011/main" val="1"/>
                 </a:ext>
               </a:extLst>
             </p:spPr>
@@ -5970,7 +6060,7 @@
         </p:nvGrpSpPr>
         <p:grpSpPr>
           <a:xfrm>
-            <a:off x="6744325" y="1617340"/>
+            <a:off x="6187779" y="1634070"/>
             <a:ext cx="297677" cy="401392"/>
             <a:chOff x="0" y="-1"/>
             <a:chExt cx="214936" cy="277767"/>
@@ -6149,7 +6239,7 @@
         </p:nvGrpSpPr>
         <p:grpSpPr>
           <a:xfrm>
-            <a:off x="6708963" y="1711372"/>
+            <a:off x="6152417" y="1728102"/>
             <a:ext cx="297679" cy="401393"/>
             <a:chOff x="0" y="-1"/>
             <a:chExt cx="214937" cy="277767"/>
@@ -6328,7 +6418,7 @@
         </p:nvGrpSpPr>
         <p:grpSpPr>
           <a:xfrm>
-            <a:off x="6669597" y="1804293"/>
+            <a:off x="6113051" y="1821023"/>
             <a:ext cx="297740" cy="401392"/>
             <a:chOff x="-44" y="-1"/>
             <a:chExt cx="214981" cy="277767"/>
@@ -6467,7 +6557,7 @@
               <a:effectLst/>
               <a:extLst>
                 <a:ext uri="{C572A759-6A51-4108-AA02-DFA0A04FC94B}">
-                  <ma14:wrappingTextBoxFlag xmlns:ma14="http://schemas.microsoft.com/office/mac/drawingml/2011/main" xmlns="" val="1"/>
+                  <ma14:wrappingTextBoxFlag xmlns="" xmlns:ma14="http://schemas.microsoft.com/office/mac/drawingml/2011/main" val="1"/>
                 </a:ext>
               </a:extLst>
             </p:spPr>
@@ -6580,7 +6670,7 @@
         </p:nvSpPr>
         <p:spPr>
           <a:xfrm>
-            <a:off x="5827426" y="1152094"/>
+            <a:off x="5287658" y="1243433"/>
             <a:ext cx="1264901" cy="220229"/>
           </a:xfrm>
           <a:prstGeom prst="rect">
@@ -6591,7 +6681,7 @@
           </a:ln>
           <a:extLst>
             <a:ext uri="{C572A759-6A51-4108-AA02-DFA0A04FC94B}">
-              <ma14:wrappingTextBoxFlag xmlns:ma14="http://schemas.microsoft.com/office/mac/drawingml/2011/main" xmlns="" val="1"/>
+              <ma14:wrappingTextBoxFlag xmlns="" xmlns:ma14="http://schemas.microsoft.com/office/mac/drawingml/2011/main" val="1"/>
             </a:ext>
           </a:extLst>
         </p:spPr>
@@ -6609,6 +6699,7 @@
           </a:lstStyle>
           <a:p>
             <a:r>
+              <a:rPr dirty="0"/>
               <a:t>…</a:t>
             </a:r>
           </a:p>
@@ -6628,8 +6719,8 @@
         </p:nvSpPr>
         <p:spPr>
           <a:xfrm flipH="1" flipV="1">
-            <a:off x="5052536" y="3845439"/>
-            <a:ext cx="657448" cy="1322452"/>
+            <a:off x="4512768" y="3845438"/>
+            <a:ext cx="721764" cy="1404393"/>
           </a:xfrm>
           <a:prstGeom prst="line">
             <a:avLst/>
@@ -6664,7 +6755,7 @@
         </p:nvGrpSpPr>
         <p:grpSpPr>
           <a:xfrm>
-            <a:off x="5279738" y="4364997"/>
+            <a:off x="4781293" y="4122040"/>
             <a:ext cx="280271" cy="411550"/>
             <a:chOff x="-2" y="-2"/>
             <a:chExt cx="202368" cy="284795"/>
@@ -6783,7 +6874,7 @@
                 <a:effectLst/>
                 <a:extLst>
                   <a:ext uri="{C572A759-6A51-4108-AA02-DFA0A04FC94B}">
-                    <ma14:wrappingTextBoxFlag xmlns:ma14="http://schemas.microsoft.com/office/mac/drawingml/2011/main" xmlns="" val="1"/>
+                    <ma14:wrappingTextBoxFlag xmlns="" xmlns:ma14="http://schemas.microsoft.com/office/mac/drawingml/2011/main" val="1"/>
                   </a:ext>
                 </a:extLst>
               </p:spPr>
@@ -7004,7 +7095,7 @@
         </p:nvGrpSpPr>
         <p:grpSpPr>
           <a:xfrm>
-            <a:off x="2476856" y="4060911"/>
+            <a:off x="1514906" y="3921742"/>
             <a:ext cx="297679" cy="401392"/>
             <a:chOff x="0" y="-1"/>
             <a:chExt cx="214937" cy="277767"/>
@@ -7143,7 +7234,7 @@
               <a:effectLst/>
               <a:extLst>
                 <a:ext uri="{C572A759-6A51-4108-AA02-DFA0A04FC94B}">
-                  <ma14:wrappingTextBoxFlag xmlns:ma14="http://schemas.microsoft.com/office/mac/drawingml/2011/main" xmlns="" val="1"/>
+                  <ma14:wrappingTextBoxFlag xmlns="" xmlns:ma14="http://schemas.microsoft.com/office/mac/drawingml/2011/main" val="1"/>
                 </a:ext>
               </a:extLst>
             </p:spPr>
@@ -7258,7 +7349,7 @@
         </p:nvGrpSpPr>
         <p:grpSpPr>
           <a:xfrm>
-            <a:off x="2476857" y="4582426"/>
+            <a:off x="1514907" y="4443257"/>
             <a:ext cx="297687" cy="401392"/>
             <a:chOff x="-6" y="-1"/>
             <a:chExt cx="214943" cy="277767"/>
@@ -7397,7 +7488,7 @@
               <a:effectLst/>
               <a:extLst>
                 <a:ext uri="{C572A759-6A51-4108-AA02-DFA0A04FC94B}">
-                  <ma14:wrappingTextBoxFlag xmlns:ma14="http://schemas.microsoft.com/office/mac/drawingml/2011/main" xmlns="" val="1"/>
+                  <ma14:wrappingTextBoxFlag xmlns="" xmlns:ma14="http://schemas.microsoft.com/office/mac/drawingml/2011/main" val="1"/>
                 </a:ext>
               </a:extLst>
             </p:spPr>
@@ -7510,7 +7601,7 @@
         </p:nvGrpSpPr>
         <p:grpSpPr>
           <a:xfrm>
-            <a:off x="6708276" y="5026669"/>
+            <a:off x="6193675" y="4962489"/>
             <a:ext cx="280271" cy="411550"/>
             <a:chOff x="-2" y="-2"/>
             <a:chExt cx="202368" cy="284795"/>
@@ -7629,7 +7720,7 @@
                 <a:effectLst/>
                 <a:extLst>
                   <a:ext uri="{C572A759-6A51-4108-AA02-DFA0A04FC94B}">
-                    <ma14:wrappingTextBoxFlag xmlns:ma14="http://schemas.microsoft.com/office/mac/drawingml/2011/main" xmlns="" val="1"/>
+                    <ma14:wrappingTextBoxFlag xmlns="" xmlns:ma14="http://schemas.microsoft.com/office/mac/drawingml/2011/main" val="1"/>
                   </a:ext>
                 </a:extLst>
               </p:spPr>
@@ -7850,7 +7941,7 @@
         </p:nvGrpSpPr>
         <p:grpSpPr>
           <a:xfrm>
-            <a:off x="6668971" y="5109361"/>
+            <a:off x="6154370" y="5045181"/>
             <a:ext cx="280270" cy="411548"/>
             <a:chOff x="-2" y="-2"/>
             <a:chExt cx="202368" cy="284795"/>
@@ -7969,7 +8060,7 @@
                 <a:effectLst/>
                 <a:extLst>
                   <a:ext uri="{C572A759-6A51-4108-AA02-DFA0A04FC94B}">
-                    <ma14:wrappingTextBoxFlag xmlns:ma14="http://schemas.microsoft.com/office/mac/drawingml/2011/main" xmlns="" val="1"/>
+                    <ma14:wrappingTextBoxFlag xmlns="" xmlns:ma14="http://schemas.microsoft.com/office/mac/drawingml/2011/main" val="1"/>
                   </a:ext>
                 </a:extLst>
               </p:spPr>
@@ -8190,7 +8281,7 @@
         </p:nvGrpSpPr>
         <p:grpSpPr>
           <a:xfrm>
-            <a:off x="6622416" y="5201506"/>
+            <a:off x="6107815" y="5137326"/>
             <a:ext cx="280270" cy="411550"/>
             <a:chOff x="-2" y="-2"/>
             <a:chExt cx="202368" cy="284795"/>
@@ -8309,7 +8400,7 @@
                 <a:effectLst/>
                 <a:extLst>
                   <a:ext uri="{C572A759-6A51-4108-AA02-DFA0A04FC94B}">
-                    <ma14:wrappingTextBoxFlag xmlns:ma14="http://schemas.microsoft.com/office/mac/drawingml/2011/main" xmlns="" val="1"/>
+                    <ma14:wrappingTextBoxFlag xmlns="" xmlns:ma14="http://schemas.microsoft.com/office/mac/drawingml/2011/main" val="1"/>
                   </a:ext>
                 </a:extLst>
               </p:spPr>
@@ -8530,7 +8621,7 @@
         </p:nvGrpSpPr>
         <p:grpSpPr>
           <a:xfrm>
-            <a:off x="2479997" y="5552496"/>
+            <a:off x="1518047" y="5413327"/>
             <a:ext cx="280271" cy="411548"/>
             <a:chOff x="-2" y="-2"/>
             <a:chExt cx="202368" cy="284795"/>
@@ -8649,7 +8740,7 @@
                 <a:effectLst/>
                 <a:extLst>
                   <a:ext uri="{C572A759-6A51-4108-AA02-DFA0A04FC94B}">
-                    <ma14:wrappingTextBoxFlag xmlns:ma14="http://schemas.microsoft.com/office/mac/drawingml/2011/main" xmlns="" val="1"/>
+                    <ma14:wrappingTextBoxFlag xmlns="" xmlns:ma14="http://schemas.microsoft.com/office/mac/drawingml/2011/main" val="1"/>
                   </a:ext>
                 </a:extLst>
               </p:spPr>
@@ -8870,7 +8961,7 @@
         </p:nvGrpSpPr>
         <p:grpSpPr>
           <a:xfrm>
-            <a:off x="5355501" y="2949869"/>
+            <a:off x="4815733" y="2949869"/>
             <a:ext cx="2098874" cy="202821"/>
             <a:chOff x="0" y="0"/>
             <a:chExt cx="1515491" cy="140352"/>
@@ -8975,7 +9066,7 @@
         </p:nvGrpSpPr>
         <p:grpSpPr>
           <a:xfrm>
-            <a:off x="6536166" y="3027883"/>
+            <a:off x="5996398" y="3027883"/>
             <a:ext cx="297679" cy="401392"/>
             <a:chOff x="0" y="-1"/>
             <a:chExt cx="214937" cy="277767"/>
@@ -9114,7 +9205,7 @@
               <a:effectLst/>
               <a:extLst>
                 <a:ext uri="{C572A759-6A51-4108-AA02-DFA0A04FC94B}">
-                  <ma14:wrappingTextBoxFlag xmlns:ma14="http://schemas.microsoft.com/office/mac/drawingml/2011/main" xmlns="" val="1"/>
+                  <ma14:wrappingTextBoxFlag xmlns="" xmlns:ma14="http://schemas.microsoft.com/office/mac/drawingml/2011/main" val="1"/>
                 </a:ext>
               </a:extLst>
             </p:spPr>
@@ -9229,7 +9320,7 @@
         </p:nvGrpSpPr>
         <p:grpSpPr>
           <a:xfrm>
-            <a:off x="5967320" y="2676028"/>
+            <a:off x="5427552" y="2676028"/>
             <a:ext cx="297679" cy="401392"/>
             <a:chOff x="0" y="-1"/>
             <a:chExt cx="214937" cy="277767"/>
@@ -9368,7 +9459,7 @@
               <a:effectLst/>
               <a:extLst>
                 <a:ext uri="{C572A759-6A51-4108-AA02-DFA0A04FC94B}">
-                  <ma14:wrappingTextBoxFlag xmlns:ma14="http://schemas.microsoft.com/office/mac/drawingml/2011/main" xmlns="" val="1"/>
+                  <ma14:wrappingTextBoxFlag xmlns="" xmlns:ma14="http://schemas.microsoft.com/office/mac/drawingml/2011/main" val="1"/>
                 </a:ext>
               </a:extLst>
             </p:spPr>
@@ -9481,8 +9572,8 @@
         </p:nvSpPr>
         <p:spPr>
           <a:xfrm flipV="1">
-            <a:off x="7159040" y="3858457"/>
-            <a:ext cx="527466" cy="1321291"/>
+            <a:off x="6613019" y="3858456"/>
+            <a:ext cx="533719" cy="1391374"/>
           </a:xfrm>
           <a:prstGeom prst="line">
             <a:avLst/>
@@ -9517,7 +9608,7 @@
         </p:nvGrpSpPr>
         <p:grpSpPr>
           <a:xfrm>
-            <a:off x="7276790" y="4382763"/>
+            <a:off x="6667725" y="4091802"/>
             <a:ext cx="280271" cy="411550"/>
             <a:chOff x="-2" y="-2"/>
             <a:chExt cx="202368" cy="284795"/>
@@ -9636,7 +9727,7 @@
                 <a:effectLst/>
                 <a:extLst>
                   <a:ext uri="{C572A759-6A51-4108-AA02-DFA0A04FC94B}">
-                    <ma14:wrappingTextBoxFlag xmlns:ma14="http://schemas.microsoft.com/office/mac/drawingml/2011/main" xmlns="" val="1"/>
+                    <ma14:wrappingTextBoxFlag xmlns="" xmlns:ma14="http://schemas.microsoft.com/office/mac/drawingml/2011/main" val="1"/>
                   </a:ext>
                 </a:extLst>
               </p:spPr>
@@ -9857,7 +9948,7 @@
         </p:nvGrpSpPr>
         <p:grpSpPr>
           <a:xfrm>
-            <a:off x="5822632" y="3713250"/>
+            <a:off x="5282864" y="3713250"/>
             <a:ext cx="1257106" cy="759769"/>
             <a:chOff x="0" y="0"/>
             <a:chExt cx="907692" cy="525767"/>
@@ -9945,7 +10036,7 @@
             <a:effectLst/>
             <a:extLst>
               <a:ext uri="{C572A759-6A51-4108-AA02-DFA0A04FC94B}">
-                <ma14:wrappingTextBoxFlag xmlns:ma14="http://schemas.microsoft.com/office/mac/drawingml/2011/main" xmlns="" val="1"/>
+                <ma14:wrappingTextBoxFlag xmlns="" xmlns:ma14="http://schemas.microsoft.com/office/mac/drawingml/2011/main" val="1"/>
               </a:ext>
             </a:extLst>
           </p:spPr>
@@ -9963,7 +10054,7 @@
               </a:pPr>
               <a:r>
                 <a:rPr lang="de-DE" dirty="0"/>
-                <a:t>Clearing</a:t>
+                <a:t>  Clearing</a:t>
               </a:r>
             </a:p>
             <a:p>
@@ -9975,7 +10066,7 @@
               </a:pPr>
               <a:r>
                 <a:rPr lang="de-DE" dirty="0"/>
-                <a:t>House</a:t>
+                <a:t>  House</a:t>
               </a:r>
               <a:endParaRPr dirty="0"/>
             </a:p>
@@ -9996,7 +10087,7 @@
         </p:nvGrpSpPr>
         <p:grpSpPr>
           <a:xfrm>
-            <a:off x="6705024" y="3808467"/>
+            <a:off x="6165256" y="3808467"/>
             <a:ext cx="297679" cy="401393"/>
             <a:chOff x="0" y="-1"/>
             <a:chExt cx="214937" cy="277767"/>
@@ -10186,7 +10277,7 @@
         </p:nvGrpSpPr>
         <p:grpSpPr>
           <a:xfrm>
-            <a:off x="6669662" y="3902500"/>
+            <a:off x="6129894" y="3902500"/>
             <a:ext cx="297679" cy="401393"/>
             <a:chOff x="0" y="-1"/>
             <a:chExt cx="214937" cy="277767"/>
@@ -10376,7 +10467,7 @@
         </p:nvGrpSpPr>
         <p:grpSpPr>
           <a:xfrm>
-            <a:off x="6630356" y="3995420"/>
+            <a:off x="6090588" y="3995420"/>
             <a:ext cx="297680" cy="401393"/>
             <a:chOff x="-1" y="-1"/>
             <a:chExt cx="214938" cy="277767"/>
@@ -10523,7 +10614,7 @@
               <a:effectLst/>
               <a:extLst>
                 <a:ext uri="{C572A759-6A51-4108-AA02-DFA0A04FC94B}">
-                  <ma14:wrappingTextBoxFlag xmlns:ma14="http://schemas.microsoft.com/office/mac/drawingml/2011/main" xmlns="" val="1"/>
+                  <ma14:wrappingTextBoxFlag xmlns="" xmlns:ma14="http://schemas.microsoft.com/office/mac/drawingml/2011/main" val="1"/>
                 </a:ext>
               </a:extLst>
             </p:spPr>
@@ -10649,7 +10740,7 @@
         </p:nvSpPr>
         <p:spPr>
           <a:xfrm>
-            <a:off x="2916500" y="5097823"/>
+            <a:off x="1954550" y="4958654"/>
             <a:ext cx="1821545" cy="246221"/>
           </a:xfrm>
           <a:prstGeom prst="rect">
@@ -10660,7 +10751,7 @@
           </a:ln>
           <a:extLst>
             <a:ext uri="{C572A759-6A51-4108-AA02-DFA0A04FC94B}">
-              <ma14:wrappingTextBoxFlag xmlns:ma14="http://schemas.microsoft.com/office/mac/drawingml/2011/main" xmlns="" val="1"/>
+              <ma14:wrappingTextBoxFlag xmlns="" xmlns:ma14="http://schemas.microsoft.com/office/mac/drawingml/2011/main" val="1"/>
             </a:ext>
           </a:extLst>
         </p:spPr>
@@ -10697,7 +10788,7 @@
         </p:nvGrpSpPr>
         <p:grpSpPr>
           <a:xfrm>
-            <a:off x="2469447" y="5070507"/>
+            <a:off x="1507497" y="4931338"/>
             <a:ext cx="305097" cy="401393"/>
             <a:chOff x="-5356" y="-1"/>
             <a:chExt cx="220293" cy="277767"/>
@@ -10844,7 +10935,7 @@
               <a:effectLst/>
               <a:extLst>
                 <a:ext uri="{C572A759-6A51-4108-AA02-DFA0A04FC94B}">
-                  <ma14:wrappingTextBoxFlag xmlns:ma14="http://schemas.microsoft.com/office/mac/drawingml/2011/main" xmlns="" val="1"/>
+                  <ma14:wrappingTextBoxFlag xmlns="" xmlns:ma14="http://schemas.microsoft.com/office/mac/drawingml/2011/main" val="1"/>
                 </a:ext>
               </a:extLst>
             </p:spPr>
@@ -10970,7 +11061,7 @@
         </p:nvSpPr>
         <p:spPr>
           <a:xfrm>
-            <a:off x="5355500" y="3571279"/>
+            <a:off x="4815732" y="3571279"/>
             <a:ext cx="422742" cy="344317"/>
           </a:xfrm>
           <a:prstGeom prst="line">
@@ -11006,7 +11097,7 @@
         </p:nvSpPr>
         <p:spPr>
           <a:xfrm flipH="1">
-            <a:off x="7158802" y="3549412"/>
+            <a:off x="6619034" y="3549412"/>
             <a:ext cx="377655" cy="383884"/>
           </a:xfrm>
           <a:prstGeom prst="line">
@@ -11042,7 +11133,7 @@
         </p:nvGrpSpPr>
         <p:grpSpPr>
           <a:xfrm>
-            <a:off x="7903051" y="435143"/>
+            <a:off x="7363283" y="435143"/>
             <a:ext cx="1257106" cy="759769"/>
             <a:chOff x="0" y="0"/>
             <a:chExt cx="907692" cy="525767"/>
@@ -11130,7 +11221,7 @@
             <a:effectLst/>
             <a:extLst>
               <a:ext uri="{C572A759-6A51-4108-AA02-DFA0A04FC94B}">
-                <ma14:wrappingTextBoxFlag xmlns:ma14="http://schemas.microsoft.com/office/mac/drawingml/2011/main" xmlns="" val="1"/>
+                <ma14:wrappingTextBoxFlag xmlns="" xmlns:ma14="http://schemas.microsoft.com/office/mac/drawingml/2011/main" val="1"/>
               </a:ext>
             </a:extLst>
           </p:spPr>
@@ -11140,21 +11231,21 @@
             </a:bodyPr>
             <a:lstStyle/>
             <a:p>
-              <a:pPr>
+              <a:pPr algn="ctr">
                 <a:spcBef>
                   <a:spcPts val="300"/>
                 </a:spcBef>
                 <a:defRPr sz="1100"/>
               </a:pPr>
               <a:r>
-                <a:rPr lang="de-DE" dirty="0" err="1"/>
+                <a:rPr lang="de-DE" sz="1100" dirty="0" err="1"/>
                 <a:t>Vocabulary</a:t>
               </a:r>
               <a:r>
-                <a:rPr lang="de-DE" dirty="0"/>
+                <a:rPr lang="de-DE" sz="1100" dirty="0"/>
                 <a:t> Hub</a:t>
               </a:r>
-              <a:endParaRPr dirty="0"/>
+              <a:endParaRPr sz="1100" dirty="0"/>
             </a:p>
           </p:txBody>
         </p:sp>
@@ -11173,7 +11264,7 @@
         </p:nvSpPr>
         <p:spPr>
           <a:xfrm flipH="1" flipV="1">
-            <a:off x="8609521" y="1312651"/>
+            <a:off x="8069753" y="1312651"/>
             <a:ext cx="1" cy="1283863"/>
           </a:xfrm>
           <a:prstGeom prst="line">
@@ -11215,7 +11306,7 @@
         </p:nvGrpSpPr>
         <p:grpSpPr>
           <a:xfrm>
-            <a:off x="7122443" y="3345786"/>
+            <a:off x="6582675" y="3345786"/>
             <a:ext cx="308693" cy="401392"/>
             <a:chOff x="-7953" y="-1"/>
             <a:chExt cx="222890" cy="277767"/>
@@ -11354,7 +11445,7 @@
               <a:effectLst/>
               <a:extLst>
                 <a:ext uri="{C572A759-6A51-4108-AA02-DFA0A04FC94B}">
-                  <ma14:wrappingTextBoxFlag xmlns:ma14="http://schemas.microsoft.com/office/mac/drawingml/2011/main" xmlns="" val="1"/>
+                  <ma14:wrappingTextBoxFlag xmlns="" xmlns:ma14="http://schemas.microsoft.com/office/mac/drawingml/2011/main" val="1"/>
                 </a:ext>
               </a:extLst>
             </p:spPr>
@@ -11467,7 +11558,7 @@
         </p:nvGrpSpPr>
         <p:grpSpPr>
           <a:xfrm>
-            <a:off x="5469549" y="3344768"/>
+            <a:off x="4929781" y="3344768"/>
             <a:ext cx="308693" cy="401392"/>
             <a:chOff x="-7953" y="-1"/>
             <a:chExt cx="222890" cy="277767"/>
@@ -11606,7 +11697,7 @@
               <a:effectLst/>
               <a:extLst>
                 <a:ext uri="{C572A759-6A51-4108-AA02-DFA0A04FC94B}">
-                  <ma14:wrappingTextBoxFlag xmlns:ma14="http://schemas.microsoft.com/office/mac/drawingml/2011/main" xmlns="" val="1"/>
+                  <ma14:wrappingTextBoxFlag xmlns="" xmlns:ma14="http://schemas.microsoft.com/office/mac/drawingml/2011/main" val="1"/>
                 </a:ext>
               </a:extLst>
             </p:spPr>
@@ -11719,7 +11810,7 @@
         </p:nvGrpSpPr>
         <p:grpSpPr>
           <a:xfrm>
-            <a:off x="8461970" y="1734703"/>
+            <a:off x="7922202" y="1734703"/>
             <a:ext cx="308693" cy="401392"/>
             <a:chOff x="-7953" y="-1"/>
             <a:chExt cx="222890" cy="277767"/>
@@ -11858,7 +11949,7 @@
               <a:effectLst/>
               <a:extLst>
                 <a:ext uri="{C572A759-6A51-4108-AA02-DFA0A04FC94B}">
-                  <ma14:wrappingTextBoxFlag xmlns:ma14="http://schemas.microsoft.com/office/mac/drawingml/2011/main" xmlns="" val="1"/>
+                  <ma14:wrappingTextBoxFlag xmlns="" xmlns:ma14="http://schemas.microsoft.com/office/mac/drawingml/2011/main" val="1"/>
                 </a:ext>
               </a:extLst>
             </p:spPr>
@@ -11889,6 +11980,582 @@
               <a:extLst>
                 <a:ext uri="{FF2B5EF4-FFF2-40B4-BE49-F238E27FC236}">
                   <a16:creationId xmlns:a16="http://schemas.microsoft.com/office/drawing/2014/main" id="{BE2F09ED-6995-4589-8875-EAD89F76A40C}"/>
+                </a:ext>
+              </a:extLst>
+            </p:cNvPr>
+            <p:cNvSpPr/>
+            <p:nvPr/>
+          </p:nvSpPr>
+          <p:spPr>
+            <a:xfrm>
+              <a:off x="166623" y="9062"/>
+              <a:ext cx="45468" cy="50429"/>
+            </a:xfrm>
+            <a:custGeom>
+              <a:avLst/>
+              <a:gdLst/>
+              <a:ahLst/>
+              <a:cxnLst>
+                <a:cxn ang="0">
+                  <a:pos x="wd2" y="hd2"/>
+                </a:cxn>
+                <a:cxn ang="5400000">
+                  <a:pos x="wd2" y="hd2"/>
+                </a:cxn>
+                <a:cxn ang="10800000">
+                  <a:pos x="wd2" y="hd2"/>
+                </a:cxn>
+                <a:cxn ang="16200000">
+                  <a:pos x="wd2" y="hd2"/>
+                </a:cxn>
+              </a:cxnLst>
+              <a:rect l="0" t="0" r="r" b="b"/>
+              <a:pathLst>
+                <a:path w="21600" h="21600" extrusionOk="0">
+                  <a:moveTo>
+                    <a:pt x="0" y="0"/>
+                  </a:moveTo>
+                  <a:lnTo>
+                    <a:pt x="0" y="21600"/>
+                  </a:lnTo>
+                  <a:lnTo>
+                    <a:pt x="21600" y="21600"/>
+                  </a:lnTo>
+                </a:path>
+              </a:pathLst>
+            </a:custGeom>
+            <a:noFill/>
+            <a:ln w="12700" cap="rnd">
+              <a:solidFill>
+                <a:srgbClr val="000000"/>
+              </a:solidFill>
+              <a:prstDash val="solid"/>
+              <a:round/>
+            </a:ln>
+            <a:effectLst/>
+          </p:spPr>
+          <p:txBody>
+            <a:bodyPr wrap="square" lIns="45719" tIns="45719" rIns="45719" bIns="45719" numCol="1" anchor="t">
+              <a:noAutofit/>
+            </a:bodyPr>
+            <a:lstStyle/>
+            <a:p>
+              <a:pPr>
+                <a:defRPr sz="900"/>
+              </a:pPr>
+              <a:endParaRPr sz="600"/>
+            </a:p>
+          </p:txBody>
+        </p:sp>
+      </p:grpSp>
+      <p:sp>
+        <p:nvSpPr>
+          <p:cNvPr id="190" name="Gerade Verbindung mit Pfeil 96">
+            <a:extLst>
+              <a:ext uri="{FF2B5EF4-FFF2-40B4-BE49-F238E27FC236}">
+                <a16:creationId xmlns:a16="http://schemas.microsoft.com/office/drawing/2014/main" id="{8211FD86-615B-44F6-96E0-F7CCA9F338C1}"/>
+              </a:ext>
+            </a:extLst>
+          </p:cNvPr>
+          <p:cNvSpPr/>
+          <p:nvPr/>
+        </p:nvSpPr>
+        <p:spPr>
+          <a:xfrm flipH="1" flipV="1">
+            <a:off x="4326368" y="3821563"/>
+            <a:ext cx="851165" cy="1650802"/>
+          </a:xfrm>
+          <a:prstGeom prst="line">
+            <a:avLst/>
+          </a:prstGeom>
+          <a:ln w="19050">
+            <a:solidFill>
+              <a:srgbClr val="000000"/>
+            </a:solidFill>
+            <a:prstDash val="dash"/>
+            <a:tailEnd type="triangle"/>
+          </a:ln>
+        </p:spPr>
+        <p:txBody>
+          <a:bodyPr lIns="45719" rIns="45719"/>
+          <a:lstStyle/>
+          <a:p>
+            <a:endParaRPr/>
+          </a:p>
+        </p:txBody>
+      </p:sp>
+      <p:grpSp>
+        <p:nvGrpSpPr>
+          <p:cNvPr id="191" name="Gruppieren 99">
+            <a:extLst>
+              <a:ext uri="{FF2B5EF4-FFF2-40B4-BE49-F238E27FC236}">
+                <a16:creationId xmlns:a16="http://schemas.microsoft.com/office/drawing/2014/main" id="{2D037F27-2A3F-4C95-87AC-D7BBB642BFE4}"/>
+              </a:ext>
+            </a:extLst>
+          </p:cNvPr>
+          <p:cNvGrpSpPr/>
+          <p:nvPr/>
+        </p:nvGrpSpPr>
+        <p:grpSpPr>
+          <a:xfrm>
+            <a:off x="4679957" y="4916198"/>
+            <a:ext cx="308693" cy="401392"/>
+            <a:chOff x="-7953" y="-1"/>
+            <a:chExt cx="222890" cy="277767"/>
+          </a:xfrm>
+        </p:grpSpPr>
+        <p:grpSp>
+          <p:nvGrpSpPr>
+            <p:cNvPr id="192" name="Freeform 87">
+              <a:extLst>
+                <a:ext uri="{FF2B5EF4-FFF2-40B4-BE49-F238E27FC236}">
+                  <a16:creationId xmlns:a16="http://schemas.microsoft.com/office/drawing/2014/main" id="{652082B4-5938-4E6E-B888-0C512F46BAC5}"/>
+                </a:ext>
+              </a:extLst>
+            </p:cNvPr>
+            <p:cNvGrpSpPr/>
+            <p:nvPr/>
+          </p:nvGrpSpPr>
+          <p:grpSpPr>
+            <a:xfrm>
+              <a:off x="-7953" y="-1"/>
+              <a:ext cx="222890" cy="277767"/>
+              <a:chOff x="-7953" y="0"/>
+              <a:chExt cx="222889" cy="277765"/>
+            </a:xfrm>
+          </p:grpSpPr>
+          <p:sp>
+            <p:nvSpPr>
+              <p:cNvPr id="197" name="Form">
+                <a:extLst>
+                  <a:ext uri="{FF2B5EF4-FFF2-40B4-BE49-F238E27FC236}">
+                    <a16:creationId xmlns:a16="http://schemas.microsoft.com/office/drawing/2014/main" id="{01E6AA2C-EBE0-4DE5-88D6-69AB46697851}"/>
+                  </a:ext>
+                </a:extLst>
+              </p:cNvPr>
+              <p:cNvSpPr/>
+              <p:nvPr/>
+            </p:nvSpPr>
+            <p:spPr>
+              <a:xfrm>
+                <a:off x="0" y="0"/>
+                <a:ext cx="214936" cy="277765"/>
+              </a:xfrm>
+              <a:custGeom>
+                <a:avLst/>
+                <a:gdLst/>
+                <a:ahLst/>
+                <a:cxnLst>
+                  <a:cxn ang="0">
+                    <a:pos x="wd2" y="hd2"/>
+                  </a:cxn>
+                  <a:cxn ang="5400000">
+                    <a:pos x="wd2" y="hd2"/>
+                  </a:cxn>
+                  <a:cxn ang="10800000">
+                    <a:pos x="wd2" y="hd2"/>
+                  </a:cxn>
+                  <a:cxn ang="16200000">
+                    <a:pos x="wd2" y="hd2"/>
+                  </a:cxn>
+                </a:cxnLst>
+                <a:rect l="0" t="0" r="r" b="b"/>
+                <a:pathLst>
+                  <a:path w="21600" h="21600" extrusionOk="0">
+                    <a:moveTo>
+                      <a:pt x="16532" y="0"/>
+                    </a:moveTo>
+                    <a:lnTo>
+                      <a:pt x="21600" y="4307"/>
+                    </a:lnTo>
+                    <a:lnTo>
+                      <a:pt x="21600" y="21600"/>
+                    </a:lnTo>
+                    <a:lnTo>
+                      <a:pt x="0" y="21600"/>
+                    </a:lnTo>
+                    <a:lnTo>
+                      <a:pt x="0" y="0"/>
+                    </a:lnTo>
+                    <a:lnTo>
+                      <a:pt x="16532" y="0"/>
+                    </a:lnTo>
+                    <a:close/>
+                  </a:path>
+                </a:pathLst>
+              </a:custGeom>
+              <a:solidFill>
+                <a:srgbClr val="F2F2F2"/>
+              </a:solidFill>
+              <a:ln w="12700" cap="rnd">
+                <a:solidFill>
+                  <a:srgbClr val="000000"/>
+                </a:solidFill>
+                <a:prstDash val="solid"/>
+                <a:round/>
+              </a:ln>
+              <a:effectLst/>
+            </p:spPr>
+            <p:txBody>
+              <a:bodyPr wrap="square" lIns="45719" tIns="45719" rIns="45719" bIns="45719" numCol="1" anchor="t">
+                <a:noAutofit/>
+              </a:bodyPr>
+              <a:lstStyle/>
+              <a:p>
+                <a:pPr algn="ctr">
+                  <a:defRPr sz="500"/>
+                </a:pPr>
+                <a:endParaRPr sz="600"/>
+              </a:p>
+            </p:txBody>
+          </p:sp>
+          <p:sp>
+            <p:nvSpPr>
+              <p:cNvPr id="199" name="Meta">
+                <a:extLst>
+                  <a:ext uri="{FF2B5EF4-FFF2-40B4-BE49-F238E27FC236}">
+                    <a16:creationId xmlns:a16="http://schemas.microsoft.com/office/drawing/2014/main" id="{A068E000-036E-4F5D-A385-ACE0918B0697}"/>
+                  </a:ext>
+                </a:extLst>
+              </p:cNvPr>
+              <p:cNvSpPr txBox="1"/>
+              <p:nvPr/>
+            </p:nvSpPr>
+            <p:spPr>
+              <a:xfrm>
+                <a:off x="-7953" y="126392"/>
+                <a:ext cx="214936" cy="63895"/>
+              </a:xfrm>
+              <a:prstGeom prst="rect">
+                <a:avLst/>
+              </a:prstGeom>
+              <a:noFill/>
+              <a:ln w="12700" cap="flat">
+                <a:noFill/>
+                <a:miter lim="400000"/>
+              </a:ln>
+              <a:effectLst/>
+              <a:extLst>
+                <a:ext uri="{C572A759-6A51-4108-AA02-DFA0A04FC94B}">
+                  <ma14:wrappingTextBoxFlag xmlns="" xmlns:ma14="http://schemas.microsoft.com/office/mac/drawingml/2011/main" val="1"/>
+                </a:ext>
+              </a:extLst>
+            </p:spPr>
+            <p:txBody>
+              <a:bodyPr wrap="square" lIns="0" tIns="0" rIns="0" bIns="0" numCol="1" anchor="t">
+                <a:spAutoFit/>
+              </a:bodyPr>
+              <a:lstStyle>
+                <a:lvl1pPr algn="ctr">
+                  <a:spcBef>
+                    <a:spcPts val="200"/>
+                  </a:spcBef>
+                  <a:defRPr sz="500"/>
+                </a:lvl1pPr>
+              </a:lstStyle>
+              <a:p>
+                <a:r>
+                  <a:rPr sz="600" dirty="0"/>
+                  <a:t>Meta</a:t>
+                </a:r>
+              </a:p>
+            </p:txBody>
+          </p:sp>
+        </p:grpSp>
+        <p:sp>
+          <p:nvSpPr>
+            <p:cNvPr id="194" name="Freeform 88">
+              <a:extLst>
+                <a:ext uri="{FF2B5EF4-FFF2-40B4-BE49-F238E27FC236}">
+                  <a16:creationId xmlns:a16="http://schemas.microsoft.com/office/drawing/2014/main" id="{F73D35A5-8BD9-402D-AE10-6045A4D3217E}"/>
+                </a:ext>
+              </a:extLst>
+            </p:cNvPr>
+            <p:cNvSpPr/>
+            <p:nvPr/>
+          </p:nvSpPr>
+          <p:spPr>
+            <a:xfrm>
+              <a:off x="166623" y="9062"/>
+              <a:ext cx="45468" cy="50429"/>
+            </a:xfrm>
+            <a:custGeom>
+              <a:avLst/>
+              <a:gdLst/>
+              <a:ahLst/>
+              <a:cxnLst>
+                <a:cxn ang="0">
+                  <a:pos x="wd2" y="hd2"/>
+                </a:cxn>
+                <a:cxn ang="5400000">
+                  <a:pos x="wd2" y="hd2"/>
+                </a:cxn>
+                <a:cxn ang="10800000">
+                  <a:pos x="wd2" y="hd2"/>
+                </a:cxn>
+                <a:cxn ang="16200000">
+                  <a:pos x="wd2" y="hd2"/>
+                </a:cxn>
+              </a:cxnLst>
+              <a:rect l="0" t="0" r="r" b="b"/>
+              <a:pathLst>
+                <a:path w="21600" h="21600" extrusionOk="0">
+                  <a:moveTo>
+                    <a:pt x="0" y="0"/>
+                  </a:moveTo>
+                  <a:lnTo>
+                    <a:pt x="0" y="21600"/>
+                  </a:lnTo>
+                  <a:lnTo>
+                    <a:pt x="21600" y="21600"/>
+                  </a:lnTo>
+                </a:path>
+              </a:pathLst>
+            </a:custGeom>
+            <a:noFill/>
+            <a:ln w="12700" cap="rnd">
+              <a:solidFill>
+                <a:srgbClr val="000000"/>
+              </a:solidFill>
+              <a:prstDash val="solid"/>
+              <a:round/>
+            </a:ln>
+            <a:effectLst/>
+          </p:spPr>
+          <p:txBody>
+            <a:bodyPr wrap="square" lIns="45719" tIns="45719" rIns="45719" bIns="45719" numCol="1" anchor="t">
+              <a:noAutofit/>
+            </a:bodyPr>
+            <a:lstStyle/>
+            <a:p>
+              <a:pPr>
+                <a:defRPr sz="900"/>
+              </a:pPr>
+              <a:endParaRPr sz="600"/>
+            </a:p>
+          </p:txBody>
+        </p:sp>
+      </p:grpSp>
+      <p:sp>
+        <p:nvSpPr>
+          <p:cNvPr id="202" name="Gerade Verbindung mit Pfeil 96">
+            <a:extLst>
+              <a:ext uri="{FF2B5EF4-FFF2-40B4-BE49-F238E27FC236}">
+                <a16:creationId xmlns:a16="http://schemas.microsoft.com/office/drawing/2014/main" id="{B399A2A7-04BB-4A0C-B9B3-B9FE759F1214}"/>
+              </a:ext>
+            </a:extLst>
+          </p:cNvPr>
+          <p:cNvSpPr/>
+          <p:nvPr/>
+        </p:nvSpPr>
+        <p:spPr>
+          <a:xfrm flipV="1">
+            <a:off x="6669346" y="3855459"/>
+            <a:ext cx="640619" cy="1616906"/>
+          </a:xfrm>
+          <a:prstGeom prst="line">
+            <a:avLst/>
+          </a:prstGeom>
+          <a:ln w="19050">
+            <a:solidFill>
+              <a:srgbClr val="000000"/>
+            </a:solidFill>
+            <a:prstDash val="dash"/>
+            <a:tailEnd type="triangle"/>
+          </a:ln>
+        </p:spPr>
+        <p:txBody>
+          <a:bodyPr lIns="45719" rIns="45719"/>
+          <a:lstStyle/>
+          <a:p>
+            <a:endParaRPr/>
+          </a:p>
+        </p:txBody>
+      </p:sp>
+      <p:grpSp>
+        <p:nvGrpSpPr>
+          <p:cNvPr id="209" name="Gruppieren 99">
+            <a:extLst>
+              <a:ext uri="{FF2B5EF4-FFF2-40B4-BE49-F238E27FC236}">
+                <a16:creationId xmlns:a16="http://schemas.microsoft.com/office/drawing/2014/main" id="{3F6FCCCA-AA0E-4350-9BBE-6107C501D9E5}"/>
+              </a:ext>
+            </a:extLst>
+          </p:cNvPr>
+          <p:cNvGrpSpPr/>
+          <p:nvPr/>
+        </p:nvGrpSpPr>
+        <p:grpSpPr>
+          <a:xfrm>
+            <a:off x="6811204" y="4950260"/>
+            <a:ext cx="308693" cy="401392"/>
+            <a:chOff x="-7953" y="-1"/>
+            <a:chExt cx="222890" cy="277767"/>
+          </a:xfrm>
+        </p:grpSpPr>
+        <p:grpSp>
+          <p:nvGrpSpPr>
+            <p:cNvPr id="210" name="Freeform 87">
+              <a:extLst>
+                <a:ext uri="{FF2B5EF4-FFF2-40B4-BE49-F238E27FC236}">
+                  <a16:creationId xmlns:a16="http://schemas.microsoft.com/office/drawing/2014/main" id="{3FA9DE3D-7186-45C5-93AC-73611E21F0F9}"/>
+                </a:ext>
+              </a:extLst>
+            </p:cNvPr>
+            <p:cNvGrpSpPr/>
+            <p:nvPr/>
+          </p:nvGrpSpPr>
+          <p:grpSpPr>
+            <a:xfrm>
+              <a:off x="-7953" y="-1"/>
+              <a:ext cx="222890" cy="277767"/>
+              <a:chOff x="-7953" y="0"/>
+              <a:chExt cx="222889" cy="277765"/>
+            </a:xfrm>
+          </p:grpSpPr>
+          <p:sp>
+            <p:nvSpPr>
+              <p:cNvPr id="212" name="Form">
+                <a:extLst>
+                  <a:ext uri="{FF2B5EF4-FFF2-40B4-BE49-F238E27FC236}">
+                    <a16:creationId xmlns:a16="http://schemas.microsoft.com/office/drawing/2014/main" id="{5C114004-A2BF-4F0D-B9B4-B43D4AC0EC13}"/>
+                  </a:ext>
+                </a:extLst>
+              </p:cNvPr>
+              <p:cNvSpPr/>
+              <p:nvPr/>
+            </p:nvSpPr>
+            <p:spPr>
+              <a:xfrm>
+                <a:off x="0" y="0"/>
+                <a:ext cx="214936" cy="277765"/>
+              </a:xfrm>
+              <a:custGeom>
+                <a:avLst/>
+                <a:gdLst/>
+                <a:ahLst/>
+                <a:cxnLst>
+                  <a:cxn ang="0">
+                    <a:pos x="wd2" y="hd2"/>
+                  </a:cxn>
+                  <a:cxn ang="5400000">
+                    <a:pos x="wd2" y="hd2"/>
+                  </a:cxn>
+                  <a:cxn ang="10800000">
+                    <a:pos x="wd2" y="hd2"/>
+                  </a:cxn>
+                  <a:cxn ang="16200000">
+                    <a:pos x="wd2" y="hd2"/>
+                  </a:cxn>
+                </a:cxnLst>
+                <a:rect l="0" t="0" r="r" b="b"/>
+                <a:pathLst>
+                  <a:path w="21600" h="21600" extrusionOk="0">
+                    <a:moveTo>
+                      <a:pt x="16532" y="0"/>
+                    </a:moveTo>
+                    <a:lnTo>
+                      <a:pt x="21600" y="4307"/>
+                    </a:lnTo>
+                    <a:lnTo>
+                      <a:pt x="21600" y="21600"/>
+                    </a:lnTo>
+                    <a:lnTo>
+                      <a:pt x="0" y="21600"/>
+                    </a:lnTo>
+                    <a:lnTo>
+                      <a:pt x="0" y="0"/>
+                    </a:lnTo>
+                    <a:lnTo>
+                      <a:pt x="16532" y="0"/>
+                    </a:lnTo>
+                    <a:close/>
+                  </a:path>
+                </a:pathLst>
+              </a:custGeom>
+              <a:solidFill>
+                <a:srgbClr val="F2F2F2"/>
+              </a:solidFill>
+              <a:ln w="12700" cap="rnd">
+                <a:solidFill>
+                  <a:srgbClr val="000000"/>
+                </a:solidFill>
+                <a:prstDash val="solid"/>
+                <a:round/>
+              </a:ln>
+              <a:effectLst/>
+            </p:spPr>
+            <p:txBody>
+              <a:bodyPr wrap="square" lIns="45719" tIns="45719" rIns="45719" bIns="45719" numCol="1" anchor="t">
+                <a:noAutofit/>
+              </a:bodyPr>
+              <a:lstStyle/>
+              <a:p>
+                <a:pPr algn="ctr">
+                  <a:defRPr sz="500"/>
+                </a:pPr>
+                <a:endParaRPr sz="600"/>
+              </a:p>
+            </p:txBody>
+          </p:sp>
+          <p:sp>
+            <p:nvSpPr>
+              <p:cNvPr id="213" name="Meta">
+                <a:extLst>
+                  <a:ext uri="{FF2B5EF4-FFF2-40B4-BE49-F238E27FC236}">
+                    <a16:creationId xmlns:a16="http://schemas.microsoft.com/office/drawing/2014/main" id="{6D485D8B-6B3D-4A9B-B820-54A8A2B6B80B}"/>
+                  </a:ext>
+                </a:extLst>
+              </p:cNvPr>
+              <p:cNvSpPr txBox="1"/>
+              <p:nvPr/>
+            </p:nvSpPr>
+            <p:spPr>
+              <a:xfrm>
+                <a:off x="-7953" y="126392"/>
+                <a:ext cx="214936" cy="63895"/>
+              </a:xfrm>
+              <a:prstGeom prst="rect">
+                <a:avLst/>
+              </a:prstGeom>
+              <a:noFill/>
+              <a:ln w="12700" cap="flat">
+                <a:noFill/>
+                <a:miter lim="400000"/>
+              </a:ln>
+              <a:effectLst/>
+              <a:extLst>
+                <a:ext uri="{C572A759-6A51-4108-AA02-DFA0A04FC94B}">
+                  <ma14:wrappingTextBoxFlag xmlns="" xmlns:ma14="http://schemas.microsoft.com/office/mac/drawingml/2011/main" val="1"/>
+                </a:ext>
+              </a:extLst>
+            </p:spPr>
+            <p:txBody>
+              <a:bodyPr wrap="square" lIns="0" tIns="0" rIns="0" bIns="0" numCol="1" anchor="t">
+                <a:spAutoFit/>
+              </a:bodyPr>
+              <a:lstStyle>
+                <a:lvl1pPr algn="ctr">
+                  <a:spcBef>
+                    <a:spcPts val="200"/>
+                  </a:spcBef>
+                  <a:defRPr sz="500"/>
+                </a:lvl1pPr>
+              </a:lstStyle>
+              <a:p>
+                <a:r>
+                  <a:rPr sz="600" dirty="0"/>
+                  <a:t>Meta</a:t>
+                </a:r>
+              </a:p>
+            </p:txBody>
+          </p:sp>
+        </p:grpSp>
+        <p:sp>
+          <p:nvSpPr>
+            <p:cNvPr id="211" name="Freeform 88">
+              <a:extLst>
+                <a:ext uri="{FF2B5EF4-FFF2-40B4-BE49-F238E27FC236}">
+                  <a16:creationId xmlns:a16="http://schemas.microsoft.com/office/drawing/2014/main" id="{53E002BD-1C1A-4A99-9770-3C32E29DD127}"/>
                 </a:ext>
               </a:extLst>
             </p:cNvPr>

</xml_diff>